<commit_message>
Finished simulation, started lab report
</commit_message>
<xml_diff>
--- a/docs/assets/Lab4BlockStateDiagram.pptx
+++ b/docs/assets/Lab4BlockStateDiagram.pptx
@@ -259,7 +259,7 @@
           <a:p>
             <a:fld id="{9A4E9037-DFEE-4534-A087-EECC7FE82A7F}" type="datetimeFigureOut">
               <a:rPr lang="en-US" smtClean="0"/>
-              <a:t>9/19/2024</a:t>
+              <a:t>10/1/2024</a:t>
             </a:fld>
             <a:endParaRPr lang="en-US"/>
           </a:p>
@@ -457,7 +457,7 @@
           <a:p>
             <a:fld id="{9A4E9037-DFEE-4534-A087-EECC7FE82A7F}" type="datetimeFigureOut">
               <a:rPr lang="en-US" smtClean="0"/>
-              <a:t>9/19/2024</a:t>
+              <a:t>10/1/2024</a:t>
             </a:fld>
             <a:endParaRPr lang="en-US"/>
           </a:p>
@@ -665,7 +665,7 @@
           <a:p>
             <a:fld id="{9A4E9037-DFEE-4534-A087-EECC7FE82A7F}" type="datetimeFigureOut">
               <a:rPr lang="en-US" smtClean="0"/>
-              <a:t>9/19/2024</a:t>
+              <a:t>10/1/2024</a:t>
             </a:fld>
             <a:endParaRPr lang="en-US"/>
           </a:p>
@@ -863,7 +863,7 @@
           <a:p>
             <a:fld id="{9A4E9037-DFEE-4534-A087-EECC7FE82A7F}" type="datetimeFigureOut">
               <a:rPr lang="en-US" smtClean="0"/>
-              <a:t>9/19/2024</a:t>
+              <a:t>10/1/2024</a:t>
             </a:fld>
             <a:endParaRPr lang="en-US"/>
           </a:p>
@@ -1138,7 +1138,7 @@
           <a:p>
             <a:fld id="{9A4E9037-DFEE-4534-A087-EECC7FE82A7F}" type="datetimeFigureOut">
               <a:rPr lang="en-US" smtClean="0"/>
-              <a:t>9/19/2024</a:t>
+              <a:t>10/1/2024</a:t>
             </a:fld>
             <a:endParaRPr lang="en-US"/>
           </a:p>
@@ -1403,7 +1403,7 @@
           <a:p>
             <a:fld id="{9A4E9037-DFEE-4534-A087-EECC7FE82A7F}" type="datetimeFigureOut">
               <a:rPr lang="en-US" smtClean="0"/>
-              <a:t>9/19/2024</a:t>
+              <a:t>10/1/2024</a:t>
             </a:fld>
             <a:endParaRPr lang="en-US"/>
           </a:p>
@@ -1815,7 +1815,7 @@
           <a:p>
             <a:fld id="{9A4E9037-DFEE-4534-A087-EECC7FE82A7F}" type="datetimeFigureOut">
               <a:rPr lang="en-US" smtClean="0"/>
-              <a:t>9/19/2024</a:t>
+              <a:t>10/1/2024</a:t>
             </a:fld>
             <a:endParaRPr lang="en-US"/>
           </a:p>
@@ -1956,7 +1956,7 @@
           <a:p>
             <a:fld id="{9A4E9037-DFEE-4534-A087-EECC7FE82A7F}" type="datetimeFigureOut">
               <a:rPr lang="en-US" smtClean="0"/>
-              <a:t>9/19/2024</a:t>
+              <a:t>10/1/2024</a:t>
             </a:fld>
             <a:endParaRPr lang="en-US"/>
           </a:p>
@@ -2069,7 +2069,7 @@
           <a:p>
             <a:fld id="{9A4E9037-DFEE-4534-A087-EECC7FE82A7F}" type="datetimeFigureOut">
               <a:rPr lang="en-US" smtClean="0"/>
-              <a:t>9/19/2024</a:t>
+              <a:t>10/1/2024</a:t>
             </a:fld>
             <a:endParaRPr lang="en-US"/>
           </a:p>
@@ -2380,7 +2380,7 @@
           <a:p>
             <a:fld id="{9A4E9037-DFEE-4534-A087-EECC7FE82A7F}" type="datetimeFigureOut">
               <a:rPr lang="en-US" smtClean="0"/>
-              <a:t>9/19/2024</a:t>
+              <a:t>10/1/2024</a:t>
             </a:fld>
             <a:endParaRPr lang="en-US"/>
           </a:p>
@@ -2668,7 +2668,7 @@
           <a:p>
             <a:fld id="{9A4E9037-DFEE-4534-A087-EECC7FE82A7F}" type="datetimeFigureOut">
               <a:rPr lang="en-US" smtClean="0"/>
-              <a:t>9/19/2024</a:t>
+              <a:t>10/1/2024</a:t>
             </a:fld>
             <a:endParaRPr lang="en-US"/>
           </a:p>
@@ -2909,7 +2909,7 @@
           <a:p>
             <a:fld id="{9A4E9037-DFEE-4534-A087-EECC7FE82A7F}" type="datetimeFigureOut">
               <a:rPr lang="en-US" smtClean="0"/>
-              <a:t>9/19/2024</a:t>
+              <a:t>10/1/2024</a:t>
             </a:fld>
             <a:endParaRPr lang="en-US"/>
           </a:p>
@@ -7642,1091 +7642,1383 @@
           </a:p>
         </p:txBody>
       </p:sp>
-      <p:grpSp>
-        <p:nvGrpSpPr>
-          <p:cNvPr id="130" name="Group 129">
-            <a:extLst>
-              <a:ext uri="{FF2B5EF4-FFF2-40B4-BE49-F238E27FC236}">
-                <a16:creationId xmlns:a16="http://schemas.microsoft.com/office/drawing/2014/main" id="{3C4A9384-6072-5BF6-4FF8-C2900889DA1B}"/>
-              </a:ext>
-            </a:extLst>
-          </p:cNvPr>
-          <p:cNvGrpSpPr/>
+      <p:sp>
+        <p:nvSpPr>
+          <p:cNvPr id="114" name="Rectangle 113">
+            <a:extLst>
+              <a:ext uri="{FF2B5EF4-FFF2-40B4-BE49-F238E27FC236}">
+                <a16:creationId xmlns:a16="http://schemas.microsoft.com/office/drawing/2014/main" id="{69C3EFB9-A51D-9D0C-161F-099B24597556}"/>
+              </a:ext>
+            </a:extLst>
+          </p:cNvPr>
+          <p:cNvSpPr/>
           <p:nvPr/>
-        </p:nvGrpSpPr>
-        <p:grpSpPr>
+        </p:nvSpPr>
+        <p:spPr>
           <a:xfrm>
-            <a:off x="717158" y="2642870"/>
-            <a:ext cx="10953786" cy="4123535"/>
-            <a:chOff x="717158" y="2669962"/>
-            <a:chExt cx="10953786" cy="4123535"/>
+            <a:off x="2943720" y="2642870"/>
+            <a:ext cx="6486591" cy="4123535"/>
           </a:xfrm>
-        </p:grpSpPr>
-        <p:sp>
-          <p:nvSpPr>
-            <p:cNvPr id="114" name="Rectangle 113">
-              <a:extLst>
-                <a:ext uri="{FF2B5EF4-FFF2-40B4-BE49-F238E27FC236}">
-                  <a16:creationId xmlns:a16="http://schemas.microsoft.com/office/drawing/2014/main" id="{69C3EFB9-A51D-9D0C-161F-099B24597556}"/>
-                </a:ext>
-              </a:extLst>
-            </p:cNvPr>
-            <p:cNvSpPr/>
-            <p:nvPr/>
-          </p:nvSpPr>
-          <p:spPr>
-            <a:xfrm>
-              <a:off x="2943720" y="2669962"/>
-              <a:ext cx="6486591" cy="4123535"/>
-            </a:xfrm>
-            <a:prstGeom prst="rect">
-              <a:avLst/>
-            </a:prstGeom>
-          </p:spPr>
-          <p:style>
-            <a:lnRef idx="2">
-              <a:schemeClr val="accent1">
-                <a:shade val="15000"/>
-              </a:schemeClr>
-            </a:lnRef>
-            <a:fillRef idx="1">
-              <a:schemeClr val="accent1"/>
-            </a:fillRef>
-            <a:effectRef idx="0">
-              <a:schemeClr val="accent1"/>
-            </a:effectRef>
-            <a:fontRef idx="minor">
-              <a:schemeClr val="lt1"/>
-            </a:fontRef>
-          </p:style>
-          <p:txBody>
-            <a:bodyPr rtlCol="0" anchor="t" anchorCtr="0"/>
-            <a:lstStyle/>
-            <a:p>
-              <a:r>
-                <a:rPr lang="en-US" dirty="0" err="1"/>
-                <a:t>LED_Patterns</a:t>
-              </a:r>
-              <a:endParaRPr lang="en-US" dirty="0"/>
-            </a:p>
-          </p:txBody>
-        </p:sp>
-        <p:cxnSp>
-          <p:nvCxnSpPr>
-            <p:cNvPr id="135" name="Straight Arrow Connector 134">
-              <a:extLst>
-                <a:ext uri="{FF2B5EF4-FFF2-40B4-BE49-F238E27FC236}">
-                  <a16:creationId xmlns:a16="http://schemas.microsoft.com/office/drawing/2014/main" id="{F4B3E0B7-5924-5D4C-29EF-155BF0A169DC}"/>
-                </a:ext>
-              </a:extLst>
-            </p:cNvPr>
-            <p:cNvCxnSpPr>
-              <a:cxnSpLocks/>
-              <a:stCxn id="126" idx="3"/>
-            </p:cNvCxnSpPr>
-            <p:nvPr/>
-          </p:nvCxnSpPr>
-          <p:spPr>
-            <a:xfrm flipV="1">
-              <a:off x="2603522" y="4990873"/>
-              <a:ext cx="761483" cy="1120"/>
-            </a:xfrm>
-            <a:prstGeom prst="straightConnector1">
-              <a:avLst/>
-            </a:prstGeom>
-            <a:ln w="57150">
-              <a:tailEnd type="triangle"/>
-            </a:ln>
-          </p:spPr>
-          <p:style>
-            <a:lnRef idx="2">
-              <a:schemeClr val="dk1"/>
-            </a:lnRef>
-            <a:fillRef idx="0">
-              <a:schemeClr val="dk1"/>
-            </a:fillRef>
-            <a:effectRef idx="1">
-              <a:schemeClr val="dk1"/>
-            </a:effectRef>
-            <a:fontRef idx="minor">
-              <a:schemeClr val="tx1"/>
-            </a:fontRef>
-          </p:style>
-        </p:cxnSp>
-        <p:cxnSp>
-          <p:nvCxnSpPr>
-            <p:cNvPr id="132" name="Straight Arrow Connector 131">
-              <a:extLst>
-                <a:ext uri="{FF2B5EF4-FFF2-40B4-BE49-F238E27FC236}">
-                  <a16:creationId xmlns:a16="http://schemas.microsoft.com/office/drawing/2014/main" id="{4B0CA60C-419E-37BF-4C55-B2D4FC6D45E2}"/>
-                </a:ext>
-              </a:extLst>
-            </p:cNvPr>
-            <p:cNvCxnSpPr>
-              <a:cxnSpLocks/>
-            </p:cNvCxnSpPr>
-            <p:nvPr/>
-          </p:nvCxnSpPr>
-          <p:spPr>
-            <a:xfrm>
-              <a:off x="3966776" y="4307272"/>
-              <a:ext cx="0" cy="420672"/>
-            </a:xfrm>
-            <a:prstGeom prst="straightConnector1">
-              <a:avLst/>
-            </a:prstGeom>
-            <a:ln w="57150">
-              <a:tailEnd type="triangle"/>
-            </a:ln>
-          </p:spPr>
-          <p:style>
-            <a:lnRef idx="2">
-              <a:schemeClr val="dk1"/>
-            </a:lnRef>
-            <a:fillRef idx="0">
-              <a:schemeClr val="dk1"/>
-            </a:fillRef>
-            <a:effectRef idx="1">
-              <a:schemeClr val="dk1"/>
-            </a:effectRef>
-            <a:fontRef idx="minor">
-              <a:schemeClr val="tx1"/>
-            </a:fontRef>
-          </p:style>
-        </p:cxnSp>
-        <p:sp>
-          <p:nvSpPr>
-            <p:cNvPr id="120" name="Rectangle 119">
-              <a:extLst>
-                <a:ext uri="{FF2B5EF4-FFF2-40B4-BE49-F238E27FC236}">
-                  <a16:creationId xmlns:a16="http://schemas.microsoft.com/office/drawing/2014/main" id="{1C957066-6CE1-00AE-ECC0-F69C53DD555B}"/>
-                </a:ext>
-              </a:extLst>
-            </p:cNvPr>
-            <p:cNvSpPr/>
-            <p:nvPr/>
-          </p:nvSpPr>
-          <p:spPr>
-            <a:xfrm>
-              <a:off x="732077" y="4081779"/>
-              <a:ext cx="1880208" cy="528007"/>
-            </a:xfrm>
-            <a:prstGeom prst="rect">
-              <a:avLst/>
-            </a:prstGeom>
-          </p:spPr>
-          <p:style>
-            <a:lnRef idx="2">
-              <a:schemeClr val="accent2">
-                <a:shade val="15000"/>
-              </a:schemeClr>
-            </a:lnRef>
-            <a:fillRef idx="1">
-              <a:schemeClr val="accent2"/>
-            </a:fillRef>
-            <a:effectRef idx="0">
-              <a:schemeClr val="accent2"/>
-            </a:effectRef>
-            <a:fontRef idx="minor">
-              <a:schemeClr val="lt1"/>
-            </a:fontRef>
-          </p:style>
-          <p:txBody>
-            <a:bodyPr rtlCol="0" anchor="ctr"/>
-            <a:lstStyle/>
-            <a:p>
-              <a:pPr algn="ctr"/>
-              <a:r>
-                <a:rPr lang="en-US" dirty="0"/>
-                <a:t>Switches[3:0]</a:t>
-              </a:r>
-            </a:p>
-          </p:txBody>
-        </p:sp>
-        <p:sp>
-          <p:nvSpPr>
-            <p:cNvPr id="126" name="Rectangle 125">
-              <a:extLst>
-                <a:ext uri="{FF2B5EF4-FFF2-40B4-BE49-F238E27FC236}">
-                  <a16:creationId xmlns:a16="http://schemas.microsoft.com/office/drawing/2014/main" id="{1EE40E2F-C69C-8F7C-79C7-5BDEB7A5742B}"/>
-                </a:ext>
-              </a:extLst>
-            </p:cNvPr>
-            <p:cNvSpPr/>
-            <p:nvPr/>
-          </p:nvSpPr>
-          <p:spPr>
-            <a:xfrm>
-              <a:off x="723314" y="4727989"/>
-              <a:ext cx="1880208" cy="528007"/>
-            </a:xfrm>
-            <a:prstGeom prst="rect">
-              <a:avLst/>
-            </a:prstGeom>
-          </p:spPr>
-          <p:style>
-            <a:lnRef idx="2">
-              <a:schemeClr val="accent2">
-                <a:shade val="15000"/>
-              </a:schemeClr>
-            </a:lnRef>
-            <a:fillRef idx="1">
-              <a:schemeClr val="accent2"/>
-            </a:fillRef>
-            <a:effectRef idx="0">
-              <a:schemeClr val="accent2"/>
-            </a:effectRef>
-            <a:fontRef idx="minor">
-              <a:schemeClr val="lt1"/>
-            </a:fontRef>
-          </p:style>
-          <p:txBody>
-            <a:bodyPr rtlCol="0" anchor="ctr"/>
-            <a:lstStyle/>
-            <a:p>
-              <a:pPr algn="ctr"/>
-              <a:r>
-                <a:rPr lang="en-US" dirty="0" err="1"/>
-                <a:t>hps_led_control</a:t>
-              </a:r>
-              <a:endParaRPr lang="en-US" dirty="0"/>
-            </a:p>
-          </p:txBody>
-        </p:sp>
-        <p:sp>
-          <p:nvSpPr>
-            <p:cNvPr id="127" name="Rectangle 126">
-              <a:extLst>
-                <a:ext uri="{FF2B5EF4-FFF2-40B4-BE49-F238E27FC236}">
-                  <a16:creationId xmlns:a16="http://schemas.microsoft.com/office/drawing/2014/main" id="{69601582-3D11-C88E-BEAA-D63F092CEFB9}"/>
-                </a:ext>
-              </a:extLst>
-            </p:cNvPr>
-            <p:cNvSpPr/>
-            <p:nvPr/>
-          </p:nvSpPr>
-          <p:spPr>
-            <a:xfrm>
-              <a:off x="723313" y="5374036"/>
-              <a:ext cx="1880208" cy="528008"/>
-            </a:xfrm>
-            <a:prstGeom prst="rect">
-              <a:avLst/>
-            </a:prstGeom>
-          </p:spPr>
-          <p:style>
-            <a:lnRef idx="2">
-              <a:schemeClr val="accent2">
-                <a:shade val="15000"/>
-              </a:schemeClr>
-            </a:lnRef>
-            <a:fillRef idx="1">
-              <a:schemeClr val="accent2"/>
-            </a:fillRef>
-            <a:effectRef idx="0">
-              <a:schemeClr val="accent2"/>
-            </a:effectRef>
-            <a:fontRef idx="minor">
-              <a:schemeClr val="lt1"/>
-            </a:fontRef>
-          </p:style>
-          <p:txBody>
-            <a:bodyPr rtlCol="0" anchor="ctr"/>
-            <a:lstStyle/>
-            <a:p>
-              <a:pPr algn="ctr"/>
-              <a:r>
-                <a:rPr lang="en-US" dirty="0" err="1"/>
-                <a:t>base_period</a:t>
-              </a:r>
-              <a:r>
-                <a:rPr lang="en-US" dirty="0"/>
-                <a:t>[7:0]</a:t>
-              </a:r>
-            </a:p>
-          </p:txBody>
-        </p:sp>
-        <p:sp>
-          <p:nvSpPr>
-            <p:cNvPr id="128" name="Rectangle 127">
-              <a:extLst>
-                <a:ext uri="{FF2B5EF4-FFF2-40B4-BE49-F238E27FC236}">
-                  <a16:creationId xmlns:a16="http://schemas.microsoft.com/office/drawing/2014/main" id="{B9C431CA-B96B-03A9-507A-F78BFF8D5A24}"/>
-                </a:ext>
-              </a:extLst>
-            </p:cNvPr>
-            <p:cNvSpPr/>
-            <p:nvPr/>
-          </p:nvSpPr>
-          <p:spPr>
-            <a:xfrm>
-              <a:off x="717158" y="6020083"/>
-              <a:ext cx="1880208" cy="528008"/>
-            </a:xfrm>
-            <a:prstGeom prst="rect">
-              <a:avLst/>
-            </a:prstGeom>
-          </p:spPr>
-          <p:style>
-            <a:lnRef idx="2">
-              <a:schemeClr val="accent2">
-                <a:shade val="15000"/>
-              </a:schemeClr>
-            </a:lnRef>
-            <a:fillRef idx="1">
-              <a:schemeClr val="accent2"/>
-            </a:fillRef>
-            <a:effectRef idx="0">
-              <a:schemeClr val="accent2"/>
-            </a:effectRef>
-            <a:fontRef idx="minor">
-              <a:schemeClr val="lt1"/>
-            </a:fontRef>
-          </p:style>
-          <p:txBody>
-            <a:bodyPr rtlCol="0" anchor="ctr"/>
-            <a:lstStyle/>
-            <a:p>
-              <a:pPr algn="ctr"/>
-              <a:r>
-                <a:rPr lang="en-US" dirty="0" err="1"/>
-                <a:t>led_reg</a:t>
-              </a:r>
-              <a:r>
-                <a:rPr lang="en-US" dirty="0"/>
-                <a:t>[7:0]</a:t>
-              </a:r>
-            </a:p>
-          </p:txBody>
-        </p:sp>
-        <p:sp>
-          <p:nvSpPr>
-            <p:cNvPr id="138" name="Rectangle 137">
-              <a:extLst>
-                <a:ext uri="{FF2B5EF4-FFF2-40B4-BE49-F238E27FC236}">
-                  <a16:creationId xmlns:a16="http://schemas.microsoft.com/office/drawing/2014/main" id="{73013F2A-DCB6-0260-F12C-9C39AF42E934}"/>
-                </a:ext>
-              </a:extLst>
-            </p:cNvPr>
-            <p:cNvSpPr/>
-            <p:nvPr/>
-          </p:nvSpPr>
-          <p:spPr>
-            <a:xfrm>
-              <a:off x="3365005" y="4723200"/>
-              <a:ext cx="5655299" cy="1824885"/>
-            </a:xfrm>
-            <a:prstGeom prst="rect">
-              <a:avLst/>
-            </a:prstGeom>
-          </p:spPr>
-          <p:style>
-            <a:lnRef idx="2">
-              <a:schemeClr val="accent4">
-                <a:shade val="15000"/>
-              </a:schemeClr>
-            </a:lnRef>
-            <a:fillRef idx="1">
-              <a:schemeClr val="accent4"/>
-            </a:fillRef>
-            <a:effectRef idx="0">
-              <a:schemeClr val="accent4"/>
-            </a:effectRef>
-            <a:fontRef idx="minor">
-              <a:schemeClr val="lt1"/>
-            </a:fontRef>
-          </p:style>
-          <p:txBody>
-            <a:bodyPr rtlCol="0" anchor="ctr"/>
-            <a:lstStyle/>
-            <a:p>
-              <a:pPr algn="ctr"/>
-              <a:r>
-                <a:rPr lang="en-US" dirty="0"/>
-                <a:t>State Machine</a:t>
-              </a:r>
-            </a:p>
-          </p:txBody>
-        </p:sp>
-        <p:sp>
-          <p:nvSpPr>
-            <p:cNvPr id="139" name="Rectangle 138">
-              <a:extLst>
-                <a:ext uri="{FF2B5EF4-FFF2-40B4-BE49-F238E27FC236}">
-                  <a16:creationId xmlns:a16="http://schemas.microsoft.com/office/drawing/2014/main" id="{68D07B5F-A1CC-8210-A32A-123EEF998654}"/>
-                </a:ext>
-              </a:extLst>
-            </p:cNvPr>
-            <p:cNvSpPr/>
-            <p:nvPr/>
-          </p:nvSpPr>
-          <p:spPr>
-            <a:xfrm>
-              <a:off x="3357238" y="3038948"/>
-              <a:ext cx="4970538" cy="1170685"/>
-            </a:xfrm>
-            <a:prstGeom prst="rect">
-              <a:avLst/>
-            </a:prstGeom>
-          </p:spPr>
-          <p:style>
-            <a:lnRef idx="2">
-              <a:schemeClr val="accent4">
-                <a:shade val="15000"/>
-              </a:schemeClr>
-            </a:lnRef>
-            <a:fillRef idx="1">
-              <a:schemeClr val="accent4"/>
-            </a:fillRef>
-            <a:effectRef idx="0">
-              <a:schemeClr val="accent4"/>
-            </a:effectRef>
-            <a:fontRef idx="minor">
-              <a:schemeClr val="lt1"/>
-            </a:fontRef>
-          </p:style>
-          <p:txBody>
-            <a:bodyPr rtlCol="0" anchor="t" anchorCtr="0"/>
-            <a:lstStyle/>
-            <a:p>
-              <a:r>
-                <a:rPr lang="en-US" dirty="0" err="1"/>
-                <a:t>async_conditioner</a:t>
-              </a:r>
-              <a:endParaRPr lang="en-US" dirty="0"/>
-            </a:p>
-          </p:txBody>
-        </p:sp>
-        <p:cxnSp>
-          <p:nvCxnSpPr>
-            <p:cNvPr id="3" name="Straight Connector 2">
-              <a:extLst>
-                <a:ext uri="{FF2B5EF4-FFF2-40B4-BE49-F238E27FC236}">
-                  <a16:creationId xmlns:a16="http://schemas.microsoft.com/office/drawing/2014/main" id="{B4A4400C-EA25-AF21-427F-0E49D03F1727}"/>
-                </a:ext>
-              </a:extLst>
-            </p:cNvPr>
-            <p:cNvCxnSpPr/>
-            <p:nvPr/>
-          </p:nvCxnSpPr>
-          <p:spPr>
-            <a:xfrm>
-              <a:off x="2612285" y="4336100"/>
-              <a:ext cx="1354491" cy="0"/>
-            </a:xfrm>
-            <a:prstGeom prst="line">
-              <a:avLst/>
-            </a:prstGeom>
-            <a:ln w="57150"/>
-          </p:spPr>
-          <p:style>
-            <a:lnRef idx="2">
-              <a:schemeClr val="dk1"/>
-            </a:lnRef>
-            <a:fillRef idx="0">
-              <a:schemeClr val="dk1"/>
-            </a:fillRef>
-            <a:effectRef idx="1">
-              <a:schemeClr val="dk1"/>
-            </a:effectRef>
-            <a:fontRef idx="minor">
-              <a:schemeClr val="tx1"/>
-            </a:fontRef>
-          </p:style>
-        </p:cxnSp>
-        <p:cxnSp>
-          <p:nvCxnSpPr>
-            <p:cNvPr id="70" name="Straight Arrow Connector 69">
-              <a:extLst>
-                <a:ext uri="{FF2B5EF4-FFF2-40B4-BE49-F238E27FC236}">
-                  <a16:creationId xmlns:a16="http://schemas.microsoft.com/office/drawing/2014/main" id="{A75E8AAB-CAFC-8908-64F2-8873C8AA371D}"/>
-                </a:ext>
-              </a:extLst>
-            </p:cNvPr>
-            <p:cNvCxnSpPr>
-              <a:cxnSpLocks/>
-            </p:cNvCxnSpPr>
-            <p:nvPr/>
-          </p:nvCxnSpPr>
-          <p:spPr>
-            <a:xfrm flipV="1">
-              <a:off x="2595755" y="5635642"/>
-              <a:ext cx="761483" cy="1120"/>
-            </a:xfrm>
-            <a:prstGeom prst="straightConnector1">
-              <a:avLst/>
-            </a:prstGeom>
-            <a:ln w="57150">
-              <a:tailEnd type="triangle"/>
-            </a:ln>
-          </p:spPr>
-          <p:style>
-            <a:lnRef idx="2">
-              <a:schemeClr val="dk1"/>
-            </a:lnRef>
-            <a:fillRef idx="0">
-              <a:schemeClr val="dk1"/>
-            </a:fillRef>
-            <a:effectRef idx="1">
-              <a:schemeClr val="dk1"/>
-            </a:effectRef>
-            <a:fontRef idx="minor">
-              <a:schemeClr val="tx1"/>
-            </a:fontRef>
-          </p:style>
-        </p:cxnSp>
-        <p:cxnSp>
-          <p:nvCxnSpPr>
-            <p:cNvPr id="71" name="Straight Arrow Connector 70">
-              <a:extLst>
-                <a:ext uri="{FF2B5EF4-FFF2-40B4-BE49-F238E27FC236}">
-                  <a16:creationId xmlns:a16="http://schemas.microsoft.com/office/drawing/2014/main" id="{3A3E3C59-94EB-F929-2393-19A953BA88CB}"/>
-                </a:ext>
-              </a:extLst>
-            </p:cNvPr>
-            <p:cNvCxnSpPr>
-              <a:cxnSpLocks/>
-            </p:cNvCxnSpPr>
-            <p:nvPr/>
-          </p:nvCxnSpPr>
-          <p:spPr>
-            <a:xfrm flipV="1">
-              <a:off x="2595755" y="6289144"/>
-              <a:ext cx="761483" cy="1120"/>
-            </a:xfrm>
-            <a:prstGeom prst="straightConnector1">
-              <a:avLst/>
-            </a:prstGeom>
-            <a:ln w="57150">
-              <a:tailEnd type="triangle"/>
-            </a:ln>
-          </p:spPr>
-          <p:style>
-            <a:lnRef idx="2">
-              <a:schemeClr val="dk1"/>
-            </a:lnRef>
-            <a:fillRef idx="0">
-              <a:schemeClr val="dk1"/>
-            </a:fillRef>
-            <a:effectRef idx="1">
-              <a:schemeClr val="dk1"/>
-            </a:effectRef>
-            <a:fontRef idx="minor">
-              <a:schemeClr val="tx1"/>
-            </a:fontRef>
-          </p:style>
-        </p:cxnSp>
-        <p:cxnSp>
-          <p:nvCxnSpPr>
-            <p:cNvPr id="72" name="Straight Arrow Connector 71">
-              <a:extLst>
-                <a:ext uri="{FF2B5EF4-FFF2-40B4-BE49-F238E27FC236}">
-                  <a16:creationId xmlns:a16="http://schemas.microsoft.com/office/drawing/2014/main" id="{4F24F8F9-E893-52B5-70EC-3B7B2D0E7D4A}"/>
-                </a:ext>
-              </a:extLst>
-            </p:cNvPr>
-            <p:cNvCxnSpPr>
-              <a:cxnSpLocks/>
-            </p:cNvCxnSpPr>
-            <p:nvPr/>
-          </p:nvCxnSpPr>
-          <p:spPr>
-            <a:xfrm>
-              <a:off x="8581393" y="3707712"/>
-              <a:ext cx="0" cy="1033265"/>
-            </a:xfrm>
-            <a:prstGeom prst="straightConnector1">
-              <a:avLst/>
-            </a:prstGeom>
-            <a:ln w="57150">
-              <a:tailEnd type="triangle"/>
-            </a:ln>
-          </p:spPr>
-          <p:style>
-            <a:lnRef idx="2">
-              <a:schemeClr val="dk1"/>
-            </a:lnRef>
-            <a:fillRef idx="0">
-              <a:schemeClr val="dk1"/>
-            </a:fillRef>
-            <a:effectRef idx="1">
-              <a:schemeClr val="dk1"/>
-            </a:effectRef>
-            <a:fontRef idx="minor">
-              <a:schemeClr val="tx1"/>
-            </a:fontRef>
-          </p:style>
-        </p:cxnSp>
-        <p:cxnSp>
-          <p:nvCxnSpPr>
-            <p:cNvPr id="73" name="Straight Connector 72">
-              <a:extLst>
-                <a:ext uri="{FF2B5EF4-FFF2-40B4-BE49-F238E27FC236}">
-                  <a16:creationId xmlns:a16="http://schemas.microsoft.com/office/drawing/2014/main" id="{91AC6E8E-39EB-8F33-4EC7-0DFEEACBA7D2}"/>
-                </a:ext>
-              </a:extLst>
-            </p:cNvPr>
-            <p:cNvCxnSpPr>
-              <a:cxnSpLocks/>
-            </p:cNvCxnSpPr>
-            <p:nvPr/>
-          </p:nvCxnSpPr>
-          <p:spPr>
-            <a:xfrm>
-              <a:off x="7871875" y="3707712"/>
-              <a:ext cx="735133" cy="0"/>
-            </a:xfrm>
-            <a:prstGeom prst="line">
-              <a:avLst/>
-            </a:prstGeom>
-            <a:ln w="57150"/>
-          </p:spPr>
-          <p:style>
-            <a:lnRef idx="2">
-              <a:schemeClr val="dk1"/>
-            </a:lnRef>
-            <a:fillRef idx="0">
-              <a:schemeClr val="dk1"/>
-            </a:fillRef>
-            <a:effectRef idx="1">
-              <a:schemeClr val="dk1"/>
-            </a:effectRef>
-            <a:fontRef idx="minor">
-              <a:schemeClr val="tx1"/>
-            </a:fontRef>
-          </p:style>
-        </p:cxnSp>
-        <p:sp>
-          <p:nvSpPr>
-            <p:cNvPr id="79" name="Rectangle 78">
-              <a:extLst>
-                <a:ext uri="{FF2B5EF4-FFF2-40B4-BE49-F238E27FC236}">
-                  <a16:creationId xmlns:a16="http://schemas.microsoft.com/office/drawing/2014/main" id="{C12BC185-00CD-D008-C403-3633B6B8B976}"/>
-                </a:ext>
-              </a:extLst>
-            </p:cNvPr>
-            <p:cNvSpPr/>
-            <p:nvPr/>
-          </p:nvSpPr>
-          <p:spPr>
-            <a:xfrm>
-              <a:off x="9790736" y="5370232"/>
-              <a:ext cx="1880208" cy="528008"/>
-            </a:xfrm>
-            <a:prstGeom prst="rect">
-              <a:avLst/>
-            </a:prstGeom>
-          </p:spPr>
-          <p:style>
-            <a:lnRef idx="2">
-              <a:schemeClr val="accent2">
-                <a:shade val="15000"/>
-              </a:schemeClr>
-            </a:lnRef>
-            <a:fillRef idx="1">
-              <a:schemeClr val="accent2"/>
-            </a:fillRef>
-            <a:effectRef idx="0">
-              <a:schemeClr val="accent2"/>
-            </a:effectRef>
-            <a:fontRef idx="minor">
-              <a:schemeClr val="lt1"/>
-            </a:fontRef>
-          </p:style>
-          <p:txBody>
-            <a:bodyPr rtlCol="0" anchor="ctr"/>
-            <a:lstStyle/>
-            <a:p>
-              <a:pPr algn="ctr"/>
-              <a:r>
-                <a:rPr lang="en-US" dirty="0"/>
-                <a:t>led[6:0]</a:t>
-              </a:r>
-            </a:p>
-          </p:txBody>
-        </p:sp>
-        <p:cxnSp>
-          <p:nvCxnSpPr>
-            <p:cNvPr id="80" name="Straight Arrow Connector 79">
-              <a:extLst>
-                <a:ext uri="{FF2B5EF4-FFF2-40B4-BE49-F238E27FC236}">
-                  <a16:creationId xmlns:a16="http://schemas.microsoft.com/office/drawing/2014/main" id="{B6CA493D-5779-9352-A1E2-EB4197D77B42}"/>
-                </a:ext>
-              </a:extLst>
-            </p:cNvPr>
-            <p:cNvCxnSpPr>
-              <a:cxnSpLocks/>
-            </p:cNvCxnSpPr>
-            <p:nvPr/>
-          </p:nvCxnSpPr>
-          <p:spPr>
-            <a:xfrm flipV="1">
-              <a:off x="9028072" y="5634237"/>
-              <a:ext cx="761483" cy="1120"/>
-            </a:xfrm>
-            <a:prstGeom prst="straightConnector1">
-              <a:avLst/>
-            </a:prstGeom>
-            <a:ln w="57150">
-              <a:tailEnd type="triangle"/>
-            </a:ln>
-          </p:spPr>
-          <p:style>
-            <a:lnRef idx="2">
-              <a:schemeClr val="dk1"/>
-            </a:lnRef>
-            <a:fillRef idx="0">
-              <a:schemeClr val="dk1"/>
-            </a:fillRef>
-            <a:effectRef idx="1">
-              <a:schemeClr val="dk1"/>
-            </a:effectRef>
-            <a:fontRef idx="minor">
-              <a:schemeClr val="tx1"/>
-            </a:fontRef>
-          </p:style>
-        </p:cxnSp>
-        <p:sp>
-          <p:nvSpPr>
-            <p:cNvPr id="104" name="Rectangle 103">
-              <a:extLst>
-                <a:ext uri="{FF2B5EF4-FFF2-40B4-BE49-F238E27FC236}">
-                  <a16:creationId xmlns:a16="http://schemas.microsoft.com/office/drawing/2014/main" id="{669F00DD-A1F8-169F-D560-54F0A9FE3515}"/>
-                </a:ext>
-              </a:extLst>
-            </p:cNvPr>
-            <p:cNvSpPr/>
-            <p:nvPr/>
-          </p:nvSpPr>
-          <p:spPr>
-            <a:xfrm>
-              <a:off x="3638993" y="3429000"/>
-              <a:ext cx="1320954" cy="528007"/>
-            </a:xfrm>
-            <a:prstGeom prst="rect">
-              <a:avLst/>
-            </a:prstGeom>
-            <a:solidFill>
-              <a:schemeClr val="accent4">
-                <a:lumMod val="40000"/>
-                <a:lumOff val="60000"/>
-              </a:schemeClr>
-            </a:solidFill>
-          </p:spPr>
-          <p:style>
-            <a:lnRef idx="2">
-              <a:schemeClr val="accent2">
-                <a:shade val="15000"/>
-              </a:schemeClr>
-            </a:lnRef>
-            <a:fillRef idx="1">
-              <a:schemeClr val="accent2"/>
-            </a:fillRef>
-            <a:effectRef idx="0">
-              <a:schemeClr val="accent2"/>
-            </a:effectRef>
-            <a:fontRef idx="minor">
-              <a:schemeClr val="lt1"/>
-            </a:fontRef>
-          </p:style>
-          <p:txBody>
-            <a:bodyPr rtlCol="0" anchor="ctr"/>
-            <a:lstStyle/>
-            <a:p>
-              <a:pPr algn="ctr"/>
-              <a:r>
-                <a:rPr lang="en-US" dirty="0" err="1"/>
-                <a:t>syncronizer</a:t>
-              </a:r>
-              <a:endParaRPr lang="en-US" dirty="0"/>
-            </a:p>
-          </p:txBody>
-        </p:sp>
-        <p:sp>
-          <p:nvSpPr>
-            <p:cNvPr id="106" name="Rectangle 105">
-              <a:extLst>
-                <a:ext uri="{FF2B5EF4-FFF2-40B4-BE49-F238E27FC236}">
-                  <a16:creationId xmlns:a16="http://schemas.microsoft.com/office/drawing/2014/main" id="{75D5E60F-9207-CF7D-B2CB-660DE61E27AE}"/>
-                </a:ext>
-              </a:extLst>
-            </p:cNvPr>
-            <p:cNvSpPr/>
-            <p:nvPr/>
-          </p:nvSpPr>
-          <p:spPr>
-            <a:xfrm>
-              <a:off x="5182322" y="3428999"/>
-              <a:ext cx="1320954" cy="528007"/>
-            </a:xfrm>
-            <a:prstGeom prst="rect">
-              <a:avLst/>
-            </a:prstGeom>
-            <a:solidFill>
-              <a:schemeClr val="accent4">
-                <a:lumMod val="40000"/>
-                <a:lumOff val="60000"/>
-              </a:schemeClr>
-            </a:solidFill>
-          </p:spPr>
-          <p:style>
-            <a:lnRef idx="2">
-              <a:schemeClr val="accent2">
-                <a:shade val="15000"/>
-              </a:schemeClr>
-            </a:lnRef>
-            <a:fillRef idx="1">
-              <a:schemeClr val="accent2"/>
-            </a:fillRef>
-            <a:effectRef idx="0">
-              <a:schemeClr val="accent2"/>
-            </a:effectRef>
-            <a:fontRef idx="minor">
-              <a:schemeClr val="lt1"/>
-            </a:fontRef>
-          </p:style>
-          <p:txBody>
-            <a:bodyPr rtlCol="0" anchor="ctr"/>
-            <a:lstStyle/>
-            <a:p>
-              <a:pPr algn="ctr"/>
-              <a:r>
-                <a:rPr lang="en-US" dirty="0"/>
-                <a:t>debounce</a:t>
-              </a:r>
-            </a:p>
-          </p:txBody>
-        </p:sp>
-        <p:sp>
-          <p:nvSpPr>
-            <p:cNvPr id="117" name="Rectangle 116">
-              <a:extLst>
-                <a:ext uri="{FF2B5EF4-FFF2-40B4-BE49-F238E27FC236}">
-                  <a16:creationId xmlns:a16="http://schemas.microsoft.com/office/drawing/2014/main" id="{93355E55-ADB7-E2D4-C4A9-6631E5B9A293}"/>
-                </a:ext>
-              </a:extLst>
-            </p:cNvPr>
-            <p:cNvSpPr/>
-            <p:nvPr/>
-          </p:nvSpPr>
-          <p:spPr>
-            <a:xfrm>
-              <a:off x="6730955" y="3428412"/>
-              <a:ext cx="1320954" cy="528007"/>
-            </a:xfrm>
-            <a:prstGeom prst="rect">
-              <a:avLst/>
-            </a:prstGeom>
-            <a:solidFill>
-              <a:schemeClr val="accent4">
-                <a:lumMod val="40000"/>
-                <a:lumOff val="60000"/>
-              </a:schemeClr>
-            </a:solidFill>
-          </p:spPr>
-          <p:style>
-            <a:lnRef idx="2">
-              <a:schemeClr val="accent2">
-                <a:shade val="15000"/>
-              </a:schemeClr>
-            </a:lnRef>
-            <a:fillRef idx="1">
-              <a:schemeClr val="accent2"/>
-            </a:fillRef>
-            <a:effectRef idx="0">
-              <a:schemeClr val="accent2"/>
-            </a:effectRef>
-            <a:fontRef idx="minor">
-              <a:schemeClr val="lt1"/>
-            </a:fontRef>
-          </p:style>
-          <p:txBody>
-            <a:bodyPr rtlCol="0" anchor="ctr"/>
-            <a:lstStyle/>
-            <a:p>
-              <a:pPr algn="ctr"/>
-              <a:r>
-                <a:rPr lang="en-US" dirty="0" err="1"/>
-                <a:t>one_pulse</a:t>
-              </a:r>
-              <a:endParaRPr lang="en-US" dirty="0"/>
-            </a:p>
-          </p:txBody>
-        </p:sp>
-        <p:cxnSp>
-          <p:nvCxnSpPr>
-            <p:cNvPr id="86" name="Straight Arrow Connector 85">
-              <a:extLst>
-                <a:ext uri="{FF2B5EF4-FFF2-40B4-BE49-F238E27FC236}">
-                  <a16:creationId xmlns:a16="http://schemas.microsoft.com/office/drawing/2014/main" id="{646FCC43-84CC-2D21-3D5F-8D142D49005D}"/>
-                </a:ext>
-              </a:extLst>
-            </p:cNvPr>
-            <p:cNvCxnSpPr>
-              <a:cxnSpLocks/>
-            </p:cNvCxnSpPr>
-            <p:nvPr/>
-          </p:nvCxnSpPr>
-          <p:spPr>
-            <a:xfrm>
-              <a:off x="2400323" y="3702222"/>
-              <a:ext cx="1239710" cy="0"/>
-            </a:xfrm>
-            <a:prstGeom prst="straightConnector1">
-              <a:avLst/>
-            </a:prstGeom>
-            <a:ln w="57150">
-              <a:tailEnd type="triangle"/>
-            </a:ln>
-          </p:spPr>
-          <p:style>
-            <a:lnRef idx="2">
-              <a:schemeClr val="dk1"/>
-            </a:lnRef>
-            <a:fillRef idx="0">
-              <a:schemeClr val="dk1"/>
-            </a:fillRef>
-            <a:effectRef idx="1">
-              <a:schemeClr val="dk1"/>
-            </a:effectRef>
-            <a:fontRef idx="minor">
-              <a:schemeClr val="tx1"/>
-            </a:fontRef>
-          </p:style>
-        </p:cxnSp>
-        <p:sp>
-          <p:nvSpPr>
-            <p:cNvPr id="125" name="Rectangle 124">
-              <a:extLst>
-                <a:ext uri="{FF2B5EF4-FFF2-40B4-BE49-F238E27FC236}">
-                  <a16:creationId xmlns:a16="http://schemas.microsoft.com/office/drawing/2014/main" id="{B94B8CB0-B6E8-1E68-3BC7-F99A57807F1D}"/>
-                </a:ext>
-              </a:extLst>
-            </p:cNvPr>
-            <p:cNvSpPr/>
-            <p:nvPr/>
-          </p:nvSpPr>
-          <p:spPr>
-            <a:xfrm>
-              <a:off x="723314" y="3436689"/>
-              <a:ext cx="1880208" cy="528007"/>
-            </a:xfrm>
-            <a:prstGeom prst="rect">
-              <a:avLst/>
-            </a:prstGeom>
-          </p:spPr>
-          <p:style>
-            <a:lnRef idx="2">
-              <a:schemeClr val="accent2">
-                <a:shade val="15000"/>
-              </a:schemeClr>
-            </a:lnRef>
-            <a:fillRef idx="1">
-              <a:schemeClr val="accent2"/>
-            </a:fillRef>
-            <a:effectRef idx="0">
-              <a:schemeClr val="accent2"/>
-            </a:effectRef>
-            <a:fontRef idx="minor">
-              <a:schemeClr val="lt1"/>
-            </a:fontRef>
-          </p:style>
-          <p:txBody>
-            <a:bodyPr rtlCol="0" anchor="ctr"/>
-            <a:lstStyle/>
-            <a:p>
-              <a:pPr algn="ctr"/>
-              <a:r>
-                <a:rPr lang="en-US" dirty="0" err="1"/>
-                <a:t>push_button</a:t>
-              </a:r>
-              <a:endParaRPr lang="en-US" dirty="0"/>
-            </a:p>
-          </p:txBody>
-        </p:sp>
-        <p:cxnSp>
-          <p:nvCxnSpPr>
-            <p:cNvPr id="121" name="Straight Arrow Connector 120">
-              <a:extLst>
-                <a:ext uri="{FF2B5EF4-FFF2-40B4-BE49-F238E27FC236}">
-                  <a16:creationId xmlns:a16="http://schemas.microsoft.com/office/drawing/2014/main" id="{50EB79D3-8697-D44C-BEEF-5C85BC9E6679}"/>
-                </a:ext>
-              </a:extLst>
-            </p:cNvPr>
-            <p:cNvCxnSpPr>
-              <a:cxnSpLocks/>
-            </p:cNvCxnSpPr>
-            <p:nvPr/>
-          </p:nvCxnSpPr>
-          <p:spPr>
-            <a:xfrm flipV="1">
-              <a:off x="4959675" y="3691931"/>
-              <a:ext cx="245688" cy="9008"/>
-            </a:xfrm>
-            <a:prstGeom prst="straightConnector1">
-              <a:avLst/>
-            </a:prstGeom>
-            <a:ln w="57150">
-              <a:tailEnd type="triangle"/>
-            </a:ln>
-          </p:spPr>
-          <p:style>
-            <a:lnRef idx="2">
-              <a:schemeClr val="dk1"/>
-            </a:lnRef>
-            <a:fillRef idx="0">
-              <a:schemeClr val="dk1"/>
-            </a:fillRef>
-            <a:effectRef idx="1">
-              <a:schemeClr val="dk1"/>
-            </a:effectRef>
-            <a:fontRef idx="minor">
-              <a:schemeClr val="tx1"/>
-            </a:fontRef>
-          </p:style>
-        </p:cxnSp>
-        <p:cxnSp>
-          <p:nvCxnSpPr>
-            <p:cNvPr id="124" name="Straight Arrow Connector 123">
-              <a:extLst>
-                <a:ext uri="{FF2B5EF4-FFF2-40B4-BE49-F238E27FC236}">
-                  <a16:creationId xmlns:a16="http://schemas.microsoft.com/office/drawing/2014/main" id="{C59B8261-42A8-9998-8550-5FCAA9C49A1F}"/>
-                </a:ext>
-              </a:extLst>
-            </p:cNvPr>
-            <p:cNvCxnSpPr>
-              <a:cxnSpLocks/>
-            </p:cNvCxnSpPr>
-            <p:nvPr/>
-          </p:nvCxnSpPr>
-          <p:spPr>
-            <a:xfrm flipV="1">
-              <a:off x="6504250" y="3694346"/>
-              <a:ext cx="245688" cy="9008"/>
-            </a:xfrm>
-            <a:prstGeom prst="straightConnector1">
-              <a:avLst/>
-            </a:prstGeom>
-            <a:ln w="57150">
-              <a:tailEnd type="triangle"/>
-            </a:ln>
-          </p:spPr>
-          <p:style>
-            <a:lnRef idx="2">
-              <a:schemeClr val="dk1"/>
-            </a:lnRef>
-            <a:fillRef idx="0">
-              <a:schemeClr val="dk1"/>
-            </a:fillRef>
-            <a:effectRef idx="1">
-              <a:schemeClr val="dk1"/>
-            </a:effectRef>
-            <a:fontRef idx="minor">
-              <a:schemeClr val="tx1"/>
-            </a:fontRef>
-          </p:style>
-        </p:cxnSp>
-      </p:grpSp>
+          <a:prstGeom prst="rect">
+            <a:avLst/>
+          </a:prstGeom>
+        </p:spPr>
+        <p:style>
+          <a:lnRef idx="2">
+            <a:schemeClr val="accent1">
+              <a:shade val="15000"/>
+            </a:schemeClr>
+          </a:lnRef>
+          <a:fillRef idx="1">
+            <a:schemeClr val="accent1"/>
+          </a:fillRef>
+          <a:effectRef idx="0">
+            <a:schemeClr val="accent1"/>
+          </a:effectRef>
+          <a:fontRef idx="minor">
+            <a:schemeClr val="lt1"/>
+          </a:fontRef>
+        </p:style>
+        <p:txBody>
+          <a:bodyPr rtlCol="0" anchor="t" anchorCtr="0"/>
+          <a:lstStyle/>
+          <a:p>
+            <a:r>
+              <a:rPr lang="en-US" dirty="0" err="1"/>
+              <a:t>LED_Patterns</a:t>
+            </a:r>
+            <a:endParaRPr lang="en-US" dirty="0"/>
+          </a:p>
+        </p:txBody>
+      </p:sp>
+      <p:cxnSp>
+        <p:nvCxnSpPr>
+          <p:cNvPr id="135" name="Straight Arrow Connector 134">
+            <a:extLst>
+              <a:ext uri="{FF2B5EF4-FFF2-40B4-BE49-F238E27FC236}">
+                <a16:creationId xmlns:a16="http://schemas.microsoft.com/office/drawing/2014/main" id="{F4B3E0B7-5924-5D4C-29EF-155BF0A169DC}"/>
+              </a:ext>
+            </a:extLst>
+          </p:cNvPr>
+          <p:cNvCxnSpPr>
+            <a:cxnSpLocks/>
+            <a:stCxn id="126" idx="3"/>
+          </p:cNvCxnSpPr>
+          <p:nvPr/>
+        </p:nvCxnSpPr>
+        <p:spPr>
+          <a:xfrm flipV="1">
+            <a:off x="2603522" y="4963781"/>
+            <a:ext cx="761483" cy="1120"/>
+          </a:xfrm>
+          <a:prstGeom prst="straightConnector1">
+            <a:avLst/>
+          </a:prstGeom>
+          <a:ln w="57150">
+            <a:tailEnd type="triangle"/>
+          </a:ln>
+        </p:spPr>
+        <p:style>
+          <a:lnRef idx="2">
+            <a:schemeClr val="dk1"/>
+          </a:lnRef>
+          <a:fillRef idx="0">
+            <a:schemeClr val="dk1"/>
+          </a:fillRef>
+          <a:effectRef idx="1">
+            <a:schemeClr val="dk1"/>
+          </a:effectRef>
+          <a:fontRef idx="minor">
+            <a:schemeClr val="tx1"/>
+          </a:fontRef>
+        </p:style>
+      </p:cxnSp>
+      <p:cxnSp>
+        <p:nvCxnSpPr>
+          <p:cNvPr id="132" name="Straight Arrow Connector 131">
+            <a:extLst>
+              <a:ext uri="{FF2B5EF4-FFF2-40B4-BE49-F238E27FC236}">
+                <a16:creationId xmlns:a16="http://schemas.microsoft.com/office/drawing/2014/main" id="{4B0CA60C-419E-37BF-4C55-B2D4FC6D45E2}"/>
+              </a:ext>
+            </a:extLst>
+          </p:cNvPr>
+          <p:cNvCxnSpPr>
+            <a:cxnSpLocks/>
+          </p:cNvCxnSpPr>
+          <p:nvPr/>
+        </p:nvCxnSpPr>
+        <p:spPr>
+          <a:xfrm>
+            <a:off x="3966776" y="4280180"/>
+            <a:ext cx="0" cy="420672"/>
+          </a:xfrm>
+          <a:prstGeom prst="straightConnector1">
+            <a:avLst/>
+          </a:prstGeom>
+          <a:ln w="57150">
+            <a:tailEnd type="triangle"/>
+          </a:ln>
+        </p:spPr>
+        <p:style>
+          <a:lnRef idx="2">
+            <a:schemeClr val="dk1"/>
+          </a:lnRef>
+          <a:fillRef idx="0">
+            <a:schemeClr val="dk1"/>
+          </a:fillRef>
+          <a:effectRef idx="1">
+            <a:schemeClr val="dk1"/>
+          </a:effectRef>
+          <a:fontRef idx="minor">
+            <a:schemeClr val="tx1"/>
+          </a:fontRef>
+        </p:style>
+      </p:cxnSp>
+      <p:sp>
+        <p:nvSpPr>
+          <p:cNvPr id="120" name="Rectangle 119">
+            <a:extLst>
+              <a:ext uri="{FF2B5EF4-FFF2-40B4-BE49-F238E27FC236}">
+                <a16:creationId xmlns:a16="http://schemas.microsoft.com/office/drawing/2014/main" id="{1C957066-6CE1-00AE-ECC0-F69C53DD555B}"/>
+              </a:ext>
+            </a:extLst>
+          </p:cNvPr>
+          <p:cNvSpPr/>
+          <p:nvPr/>
+        </p:nvSpPr>
+        <p:spPr>
+          <a:xfrm>
+            <a:off x="732077" y="4054687"/>
+            <a:ext cx="1880208" cy="528007"/>
+          </a:xfrm>
+          <a:prstGeom prst="rect">
+            <a:avLst/>
+          </a:prstGeom>
+        </p:spPr>
+        <p:style>
+          <a:lnRef idx="2">
+            <a:schemeClr val="accent2">
+              <a:shade val="15000"/>
+            </a:schemeClr>
+          </a:lnRef>
+          <a:fillRef idx="1">
+            <a:schemeClr val="accent2"/>
+          </a:fillRef>
+          <a:effectRef idx="0">
+            <a:schemeClr val="accent2"/>
+          </a:effectRef>
+          <a:fontRef idx="minor">
+            <a:schemeClr val="lt1"/>
+          </a:fontRef>
+        </p:style>
+        <p:txBody>
+          <a:bodyPr rtlCol="0" anchor="ctr"/>
+          <a:lstStyle/>
+          <a:p>
+            <a:pPr algn="ctr"/>
+            <a:r>
+              <a:rPr lang="en-US" dirty="0"/>
+              <a:t>Switches[3:0]</a:t>
+            </a:r>
+          </a:p>
+        </p:txBody>
+      </p:sp>
+      <p:sp>
+        <p:nvSpPr>
+          <p:cNvPr id="126" name="Rectangle 125">
+            <a:extLst>
+              <a:ext uri="{FF2B5EF4-FFF2-40B4-BE49-F238E27FC236}">
+                <a16:creationId xmlns:a16="http://schemas.microsoft.com/office/drawing/2014/main" id="{1EE40E2F-C69C-8F7C-79C7-5BDEB7A5742B}"/>
+              </a:ext>
+            </a:extLst>
+          </p:cNvPr>
+          <p:cNvSpPr/>
+          <p:nvPr/>
+        </p:nvSpPr>
+        <p:spPr>
+          <a:xfrm>
+            <a:off x="723314" y="4700897"/>
+            <a:ext cx="1880208" cy="528007"/>
+          </a:xfrm>
+          <a:prstGeom prst="rect">
+            <a:avLst/>
+          </a:prstGeom>
+        </p:spPr>
+        <p:style>
+          <a:lnRef idx="2">
+            <a:schemeClr val="accent2">
+              <a:shade val="15000"/>
+            </a:schemeClr>
+          </a:lnRef>
+          <a:fillRef idx="1">
+            <a:schemeClr val="accent2"/>
+          </a:fillRef>
+          <a:effectRef idx="0">
+            <a:schemeClr val="accent2"/>
+          </a:effectRef>
+          <a:fontRef idx="minor">
+            <a:schemeClr val="lt1"/>
+          </a:fontRef>
+        </p:style>
+        <p:txBody>
+          <a:bodyPr rtlCol="0" anchor="ctr"/>
+          <a:lstStyle/>
+          <a:p>
+            <a:pPr algn="ctr"/>
+            <a:r>
+              <a:rPr lang="en-US" dirty="0" err="1"/>
+              <a:t>hps_led_control</a:t>
+            </a:r>
+            <a:endParaRPr lang="en-US" dirty="0"/>
+          </a:p>
+        </p:txBody>
+      </p:sp>
+      <p:sp>
+        <p:nvSpPr>
+          <p:cNvPr id="127" name="Rectangle 126">
+            <a:extLst>
+              <a:ext uri="{FF2B5EF4-FFF2-40B4-BE49-F238E27FC236}">
+                <a16:creationId xmlns:a16="http://schemas.microsoft.com/office/drawing/2014/main" id="{69601582-3D11-C88E-BEAA-D63F092CEFB9}"/>
+              </a:ext>
+            </a:extLst>
+          </p:cNvPr>
+          <p:cNvSpPr/>
+          <p:nvPr/>
+        </p:nvSpPr>
+        <p:spPr>
+          <a:xfrm>
+            <a:off x="723313" y="5346944"/>
+            <a:ext cx="1880208" cy="528008"/>
+          </a:xfrm>
+          <a:prstGeom prst="rect">
+            <a:avLst/>
+          </a:prstGeom>
+        </p:spPr>
+        <p:style>
+          <a:lnRef idx="2">
+            <a:schemeClr val="accent2">
+              <a:shade val="15000"/>
+            </a:schemeClr>
+          </a:lnRef>
+          <a:fillRef idx="1">
+            <a:schemeClr val="accent2"/>
+          </a:fillRef>
+          <a:effectRef idx="0">
+            <a:schemeClr val="accent2"/>
+          </a:effectRef>
+          <a:fontRef idx="minor">
+            <a:schemeClr val="lt1"/>
+          </a:fontRef>
+        </p:style>
+        <p:txBody>
+          <a:bodyPr rtlCol="0" anchor="ctr"/>
+          <a:lstStyle/>
+          <a:p>
+            <a:pPr algn="ctr"/>
+            <a:r>
+              <a:rPr lang="en-US" dirty="0" err="1"/>
+              <a:t>base_period</a:t>
+            </a:r>
+            <a:r>
+              <a:rPr lang="en-US" dirty="0"/>
+              <a:t>[7:0]</a:t>
+            </a:r>
+          </a:p>
+        </p:txBody>
+      </p:sp>
+      <p:sp>
+        <p:nvSpPr>
+          <p:cNvPr id="128" name="Rectangle 127">
+            <a:extLst>
+              <a:ext uri="{FF2B5EF4-FFF2-40B4-BE49-F238E27FC236}">
+                <a16:creationId xmlns:a16="http://schemas.microsoft.com/office/drawing/2014/main" id="{B9C431CA-B96B-03A9-507A-F78BFF8D5A24}"/>
+              </a:ext>
+            </a:extLst>
+          </p:cNvPr>
+          <p:cNvSpPr/>
+          <p:nvPr/>
+        </p:nvSpPr>
+        <p:spPr>
+          <a:xfrm>
+            <a:off x="717158" y="5992991"/>
+            <a:ext cx="1880208" cy="528008"/>
+          </a:xfrm>
+          <a:prstGeom prst="rect">
+            <a:avLst/>
+          </a:prstGeom>
+        </p:spPr>
+        <p:style>
+          <a:lnRef idx="2">
+            <a:schemeClr val="accent2">
+              <a:shade val="15000"/>
+            </a:schemeClr>
+          </a:lnRef>
+          <a:fillRef idx="1">
+            <a:schemeClr val="accent2"/>
+          </a:fillRef>
+          <a:effectRef idx="0">
+            <a:schemeClr val="accent2"/>
+          </a:effectRef>
+          <a:fontRef idx="minor">
+            <a:schemeClr val="lt1"/>
+          </a:fontRef>
+        </p:style>
+        <p:txBody>
+          <a:bodyPr rtlCol="0" anchor="ctr"/>
+          <a:lstStyle/>
+          <a:p>
+            <a:pPr algn="ctr"/>
+            <a:r>
+              <a:rPr lang="en-US" dirty="0" err="1"/>
+              <a:t>led_reg</a:t>
+            </a:r>
+            <a:r>
+              <a:rPr lang="en-US" dirty="0"/>
+              <a:t>[7:0]</a:t>
+            </a:r>
+          </a:p>
+        </p:txBody>
+      </p:sp>
+      <p:sp>
+        <p:nvSpPr>
+          <p:cNvPr id="138" name="Rectangle 137">
+            <a:extLst>
+              <a:ext uri="{FF2B5EF4-FFF2-40B4-BE49-F238E27FC236}">
+                <a16:creationId xmlns:a16="http://schemas.microsoft.com/office/drawing/2014/main" id="{73013F2A-DCB6-0260-F12C-9C39AF42E934}"/>
+              </a:ext>
+            </a:extLst>
+          </p:cNvPr>
+          <p:cNvSpPr/>
+          <p:nvPr/>
+        </p:nvSpPr>
+        <p:spPr>
+          <a:xfrm>
+            <a:off x="3365005" y="4696108"/>
+            <a:ext cx="2937565" cy="1824885"/>
+          </a:xfrm>
+          <a:prstGeom prst="rect">
+            <a:avLst/>
+          </a:prstGeom>
+        </p:spPr>
+        <p:style>
+          <a:lnRef idx="2">
+            <a:schemeClr val="accent4">
+              <a:shade val="15000"/>
+            </a:schemeClr>
+          </a:lnRef>
+          <a:fillRef idx="1">
+            <a:schemeClr val="accent4"/>
+          </a:fillRef>
+          <a:effectRef idx="0">
+            <a:schemeClr val="accent4"/>
+          </a:effectRef>
+          <a:fontRef idx="minor">
+            <a:schemeClr val="lt1"/>
+          </a:fontRef>
+        </p:style>
+        <p:txBody>
+          <a:bodyPr rtlCol="0" anchor="ctr"/>
+          <a:lstStyle/>
+          <a:p>
+            <a:pPr algn="ctr"/>
+            <a:r>
+              <a:rPr lang="en-US" dirty="0"/>
+              <a:t>State Machine</a:t>
+            </a:r>
+          </a:p>
+        </p:txBody>
+      </p:sp>
+      <p:sp>
+        <p:nvSpPr>
+          <p:cNvPr id="139" name="Rectangle 138">
+            <a:extLst>
+              <a:ext uri="{FF2B5EF4-FFF2-40B4-BE49-F238E27FC236}">
+                <a16:creationId xmlns:a16="http://schemas.microsoft.com/office/drawing/2014/main" id="{68D07B5F-A1CC-8210-A32A-123EEF998654}"/>
+              </a:ext>
+            </a:extLst>
+          </p:cNvPr>
+          <p:cNvSpPr/>
+          <p:nvPr/>
+        </p:nvSpPr>
+        <p:spPr>
+          <a:xfrm>
+            <a:off x="3357238" y="3011856"/>
+            <a:ext cx="4970538" cy="1170685"/>
+          </a:xfrm>
+          <a:prstGeom prst="rect">
+            <a:avLst/>
+          </a:prstGeom>
+        </p:spPr>
+        <p:style>
+          <a:lnRef idx="2">
+            <a:schemeClr val="accent4">
+              <a:shade val="15000"/>
+            </a:schemeClr>
+          </a:lnRef>
+          <a:fillRef idx="1">
+            <a:schemeClr val="accent4"/>
+          </a:fillRef>
+          <a:effectRef idx="0">
+            <a:schemeClr val="accent4"/>
+          </a:effectRef>
+          <a:fontRef idx="minor">
+            <a:schemeClr val="lt1"/>
+          </a:fontRef>
+        </p:style>
+        <p:txBody>
+          <a:bodyPr rtlCol="0" anchor="t" anchorCtr="0"/>
+          <a:lstStyle/>
+          <a:p>
+            <a:r>
+              <a:rPr lang="en-US" dirty="0" err="1"/>
+              <a:t>async_conditioner</a:t>
+            </a:r>
+            <a:endParaRPr lang="en-US" dirty="0"/>
+          </a:p>
+        </p:txBody>
+      </p:sp>
+      <p:cxnSp>
+        <p:nvCxnSpPr>
+          <p:cNvPr id="3" name="Straight Connector 2">
+            <a:extLst>
+              <a:ext uri="{FF2B5EF4-FFF2-40B4-BE49-F238E27FC236}">
+                <a16:creationId xmlns:a16="http://schemas.microsoft.com/office/drawing/2014/main" id="{B4A4400C-EA25-AF21-427F-0E49D03F1727}"/>
+              </a:ext>
+            </a:extLst>
+          </p:cNvPr>
+          <p:cNvCxnSpPr/>
+          <p:nvPr/>
+        </p:nvCxnSpPr>
+        <p:spPr>
+          <a:xfrm>
+            <a:off x="2612285" y="4302745"/>
+            <a:ext cx="1354491" cy="0"/>
+          </a:xfrm>
+          <a:prstGeom prst="line">
+            <a:avLst/>
+          </a:prstGeom>
+          <a:ln w="57150"/>
+        </p:spPr>
+        <p:style>
+          <a:lnRef idx="2">
+            <a:schemeClr val="dk1"/>
+          </a:lnRef>
+          <a:fillRef idx="0">
+            <a:schemeClr val="dk1"/>
+          </a:fillRef>
+          <a:effectRef idx="1">
+            <a:schemeClr val="dk1"/>
+          </a:effectRef>
+          <a:fontRef idx="minor">
+            <a:schemeClr val="tx1"/>
+          </a:fontRef>
+        </p:style>
+      </p:cxnSp>
+      <p:cxnSp>
+        <p:nvCxnSpPr>
+          <p:cNvPr id="70" name="Straight Arrow Connector 69">
+            <a:extLst>
+              <a:ext uri="{FF2B5EF4-FFF2-40B4-BE49-F238E27FC236}">
+                <a16:creationId xmlns:a16="http://schemas.microsoft.com/office/drawing/2014/main" id="{A75E8AAB-CAFC-8908-64F2-8873C8AA371D}"/>
+              </a:ext>
+            </a:extLst>
+          </p:cNvPr>
+          <p:cNvCxnSpPr>
+            <a:cxnSpLocks/>
+          </p:cNvCxnSpPr>
+          <p:nvPr/>
+        </p:nvCxnSpPr>
+        <p:spPr>
+          <a:xfrm flipV="1">
+            <a:off x="2595755" y="5608550"/>
+            <a:ext cx="761483" cy="1120"/>
+          </a:xfrm>
+          <a:prstGeom prst="straightConnector1">
+            <a:avLst/>
+          </a:prstGeom>
+          <a:ln w="57150">
+            <a:tailEnd type="triangle"/>
+          </a:ln>
+        </p:spPr>
+        <p:style>
+          <a:lnRef idx="2">
+            <a:schemeClr val="dk1"/>
+          </a:lnRef>
+          <a:fillRef idx="0">
+            <a:schemeClr val="dk1"/>
+          </a:fillRef>
+          <a:effectRef idx="1">
+            <a:schemeClr val="dk1"/>
+          </a:effectRef>
+          <a:fontRef idx="minor">
+            <a:schemeClr val="tx1"/>
+          </a:fontRef>
+        </p:style>
+      </p:cxnSp>
+      <p:cxnSp>
+        <p:nvCxnSpPr>
+          <p:cNvPr id="71" name="Straight Arrow Connector 70">
+            <a:extLst>
+              <a:ext uri="{FF2B5EF4-FFF2-40B4-BE49-F238E27FC236}">
+                <a16:creationId xmlns:a16="http://schemas.microsoft.com/office/drawing/2014/main" id="{3A3E3C59-94EB-F929-2393-19A953BA88CB}"/>
+              </a:ext>
+            </a:extLst>
+          </p:cNvPr>
+          <p:cNvCxnSpPr>
+            <a:cxnSpLocks/>
+          </p:cNvCxnSpPr>
+          <p:nvPr/>
+        </p:nvCxnSpPr>
+        <p:spPr>
+          <a:xfrm flipV="1">
+            <a:off x="2595755" y="6262052"/>
+            <a:ext cx="761483" cy="1120"/>
+          </a:xfrm>
+          <a:prstGeom prst="straightConnector1">
+            <a:avLst/>
+          </a:prstGeom>
+          <a:ln w="57150">
+            <a:tailEnd type="triangle"/>
+          </a:ln>
+        </p:spPr>
+        <p:style>
+          <a:lnRef idx="2">
+            <a:schemeClr val="dk1"/>
+          </a:lnRef>
+          <a:fillRef idx="0">
+            <a:schemeClr val="dk1"/>
+          </a:fillRef>
+          <a:effectRef idx="1">
+            <a:schemeClr val="dk1"/>
+          </a:effectRef>
+          <a:fontRef idx="minor">
+            <a:schemeClr val="tx1"/>
+          </a:fontRef>
+        </p:style>
+      </p:cxnSp>
+      <p:sp>
+        <p:nvSpPr>
+          <p:cNvPr id="79" name="Rectangle 78">
+            <a:extLst>
+              <a:ext uri="{FF2B5EF4-FFF2-40B4-BE49-F238E27FC236}">
+                <a16:creationId xmlns:a16="http://schemas.microsoft.com/office/drawing/2014/main" id="{C12BC185-00CD-D008-C403-3633B6B8B976}"/>
+              </a:ext>
+            </a:extLst>
+          </p:cNvPr>
+          <p:cNvSpPr/>
+          <p:nvPr/>
+        </p:nvSpPr>
+        <p:spPr>
+          <a:xfrm>
+            <a:off x="9662578" y="6006267"/>
+            <a:ext cx="1880208" cy="528008"/>
+          </a:xfrm>
+          <a:prstGeom prst="rect">
+            <a:avLst/>
+          </a:prstGeom>
+        </p:spPr>
+        <p:style>
+          <a:lnRef idx="2">
+            <a:schemeClr val="accent2">
+              <a:shade val="15000"/>
+            </a:schemeClr>
+          </a:lnRef>
+          <a:fillRef idx="1">
+            <a:schemeClr val="accent2"/>
+          </a:fillRef>
+          <a:effectRef idx="0">
+            <a:schemeClr val="accent2"/>
+          </a:effectRef>
+          <a:fontRef idx="minor">
+            <a:schemeClr val="lt1"/>
+          </a:fontRef>
+        </p:style>
+        <p:txBody>
+          <a:bodyPr rtlCol="0" anchor="ctr"/>
+          <a:lstStyle/>
+          <a:p>
+            <a:pPr algn="ctr"/>
+            <a:r>
+              <a:rPr lang="en-US" dirty="0"/>
+              <a:t>led[6:0]</a:t>
+            </a:r>
+          </a:p>
+        </p:txBody>
+      </p:sp>
+      <p:cxnSp>
+        <p:nvCxnSpPr>
+          <p:cNvPr id="80" name="Straight Arrow Connector 79">
+            <a:extLst>
+              <a:ext uri="{FF2B5EF4-FFF2-40B4-BE49-F238E27FC236}">
+                <a16:creationId xmlns:a16="http://schemas.microsoft.com/office/drawing/2014/main" id="{B6CA493D-5779-9352-A1E2-EB4197D77B42}"/>
+              </a:ext>
+            </a:extLst>
+          </p:cNvPr>
+          <p:cNvCxnSpPr>
+            <a:cxnSpLocks/>
+          </p:cNvCxnSpPr>
+          <p:nvPr/>
+        </p:nvCxnSpPr>
+        <p:spPr>
+          <a:xfrm flipV="1">
+            <a:off x="6302570" y="6301995"/>
+            <a:ext cx="3372311" cy="1120"/>
+          </a:xfrm>
+          <a:prstGeom prst="straightConnector1">
+            <a:avLst/>
+          </a:prstGeom>
+          <a:ln w="57150">
+            <a:tailEnd type="triangle"/>
+          </a:ln>
+        </p:spPr>
+        <p:style>
+          <a:lnRef idx="2">
+            <a:schemeClr val="dk1"/>
+          </a:lnRef>
+          <a:fillRef idx="0">
+            <a:schemeClr val="dk1"/>
+          </a:fillRef>
+          <a:effectRef idx="1">
+            <a:schemeClr val="dk1"/>
+          </a:effectRef>
+          <a:fontRef idx="minor">
+            <a:schemeClr val="tx1"/>
+          </a:fontRef>
+        </p:style>
+      </p:cxnSp>
+      <p:sp>
+        <p:nvSpPr>
+          <p:cNvPr id="104" name="Rectangle 103">
+            <a:extLst>
+              <a:ext uri="{FF2B5EF4-FFF2-40B4-BE49-F238E27FC236}">
+                <a16:creationId xmlns:a16="http://schemas.microsoft.com/office/drawing/2014/main" id="{669F00DD-A1F8-169F-D560-54F0A9FE3515}"/>
+              </a:ext>
+            </a:extLst>
+          </p:cNvPr>
+          <p:cNvSpPr/>
+          <p:nvPr/>
+        </p:nvSpPr>
+        <p:spPr>
+          <a:xfrm>
+            <a:off x="3638993" y="3401908"/>
+            <a:ext cx="1320954" cy="528007"/>
+          </a:xfrm>
+          <a:prstGeom prst="rect">
+            <a:avLst/>
+          </a:prstGeom>
+          <a:solidFill>
+            <a:schemeClr val="accent4">
+              <a:lumMod val="40000"/>
+              <a:lumOff val="60000"/>
+            </a:schemeClr>
+          </a:solidFill>
+        </p:spPr>
+        <p:style>
+          <a:lnRef idx="2">
+            <a:schemeClr val="accent2">
+              <a:shade val="15000"/>
+            </a:schemeClr>
+          </a:lnRef>
+          <a:fillRef idx="1">
+            <a:schemeClr val="accent2"/>
+          </a:fillRef>
+          <a:effectRef idx="0">
+            <a:schemeClr val="accent2"/>
+          </a:effectRef>
+          <a:fontRef idx="minor">
+            <a:schemeClr val="lt1"/>
+          </a:fontRef>
+        </p:style>
+        <p:txBody>
+          <a:bodyPr rtlCol="0" anchor="ctr"/>
+          <a:lstStyle/>
+          <a:p>
+            <a:pPr algn="ctr"/>
+            <a:r>
+              <a:rPr lang="en-US" dirty="0" err="1"/>
+              <a:t>syncronizer</a:t>
+            </a:r>
+            <a:endParaRPr lang="en-US" dirty="0"/>
+          </a:p>
+        </p:txBody>
+      </p:sp>
+      <p:sp>
+        <p:nvSpPr>
+          <p:cNvPr id="106" name="Rectangle 105">
+            <a:extLst>
+              <a:ext uri="{FF2B5EF4-FFF2-40B4-BE49-F238E27FC236}">
+                <a16:creationId xmlns:a16="http://schemas.microsoft.com/office/drawing/2014/main" id="{75D5E60F-9207-CF7D-B2CB-660DE61E27AE}"/>
+              </a:ext>
+            </a:extLst>
+          </p:cNvPr>
+          <p:cNvSpPr/>
+          <p:nvPr/>
+        </p:nvSpPr>
+        <p:spPr>
+          <a:xfrm>
+            <a:off x="5182322" y="3401907"/>
+            <a:ext cx="1320954" cy="528007"/>
+          </a:xfrm>
+          <a:prstGeom prst="rect">
+            <a:avLst/>
+          </a:prstGeom>
+          <a:solidFill>
+            <a:schemeClr val="accent4">
+              <a:lumMod val="40000"/>
+              <a:lumOff val="60000"/>
+            </a:schemeClr>
+          </a:solidFill>
+        </p:spPr>
+        <p:style>
+          <a:lnRef idx="2">
+            <a:schemeClr val="accent2">
+              <a:shade val="15000"/>
+            </a:schemeClr>
+          </a:lnRef>
+          <a:fillRef idx="1">
+            <a:schemeClr val="accent2"/>
+          </a:fillRef>
+          <a:effectRef idx="0">
+            <a:schemeClr val="accent2"/>
+          </a:effectRef>
+          <a:fontRef idx="minor">
+            <a:schemeClr val="lt1"/>
+          </a:fontRef>
+        </p:style>
+        <p:txBody>
+          <a:bodyPr rtlCol="0" anchor="ctr"/>
+          <a:lstStyle/>
+          <a:p>
+            <a:pPr algn="ctr"/>
+            <a:r>
+              <a:rPr lang="en-US" dirty="0"/>
+              <a:t>debounce</a:t>
+            </a:r>
+          </a:p>
+        </p:txBody>
+      </p:sp>
+      <p:sp>
+        <p:nvSpPr>
+          <p:cNvPr id="117" name="Rectangle 116">
+            <a:extLst>
+              <a:ext uri="{FF2B5EF4-FFF2-40B4-BE49-F238E27FC236}">
+                <a16:creationId xmlns:a16="http://schemas.microsoft.com/office/drawing/2014/main" id="{93355E55-ADB7-E2D4-C4A9-6631E5B9A293}"/>
+              </a:ext>
+            </a:extLst>
+          </p:cNvPr>
+          <p:cNvSpPr/>
+          <p:nvPr/>
+        </p:nvSpPr>
+        <p:spPr>
+          <a:xfrm>
+            <a:off x="6730955" y="3401320"/>
+            <a:ext cx="1320954" cy="528007"/>
+          </a:xfrm>
+          <a:prstGeom prst="rect">
+            <a:avLst/>
+          </a:prstGeom>
+          <a:solidFill>
+            <a:schemeClr val="accent4">
+              <a:lumMod val="40000"/>
+              <a:lumOff val="60000"/>
+            </a:schemeClr>
+          </a:solidFill>
+        </p:spPr>
+        <p:style>
+          <a:lnRef idx="2">
+            <a:schemeClr val="accent2">
+              <a:shade val="15000"/>
+            </a:schemeClr>
+          </a:lnRef>
+          <a:fillRef idx="1">
+            <a:schemeClr val="accent2"/>
+          </a:fillRef>
+          <a:effectRef idx="0">
+            <a:schemeClr val="accent2"/>
+          </a:effectRef>
+          <a:fontRef idx="minor">
+            <a:schemeClr val="lt1"/>
+          </a:fontRef>
+        </p:style>
+        <p:txBody>
+          <a:bodyPr rtlCol="0" anchor="ctr"/>
+          <a:lstStyle/>
+          <a:p>
+            <a:pPr algn="ctr"/>
+            <a:r>
+              <a:rPr lang="en-US" dirty="0" err="1"/>
+              <a:t>one_pulse</a:t>
+            </a:r>
+            <a:endParaRPr lang="en-US" dirty="0"/>
+          </a:p>
+        </p:txBody>
+      </p:sp>
+      <p:cxnSp>
+        <p:nvCxnSpPr>
+          <p:cNvPr id="86" name="Straight Arrow Connector 85">
+            <a:extLst>
+              <a:ext uri="{FF2B5EF4-FFF2-40B4-BE49-F238E27FC236}">
+                <a16:creationId xmlns:a16="http://schemas.microsoft.com/office/drawing/2014/main" id="{646FCC43-84CC-2D21-3D5F-8D142D49005D}"/>
+              </a:ext>
+            </a:extLst>
+          </p:cNvPr>
+          <p:cNvCxnSpPr>
+            <a:cxnSpLocks/>
+          </p:cNvCxnSpPr>
+          <p:nvPr/>
+        </p:nvCxnSpPr>
+        <p:spPr>
+          <a:xfrm>
+            <a:off x="2400323" y="3675130"/>
+            <a:ext cx="1239710" cy="0"/>
+          </a:xfrm>
+          <a:prstGeom prst="straightConnector1">
+            <a:avLst/>
+          </a:prstGeom>
+          <a:ln w="57150">
+            <a:tailEnd type="triangle"/>
+          </a:ln>
+        </p:spPr>
+        <p:style>
+          <a:lnRef idx="2">
+            <a:schemeClr val="dk1"/>
+          </a:lnRef>
+          <a:fillRef idx="0">
+            <a:schemeClr val="dk1"/>
+          </a:fillRef>
+          <a:effectRef idx="1">
+            <a:schemeClr val="dk1"/>
+          </a:effectRef>
+          <a:fontRef idx="minor">
+            <a:schemeClr val="tx1"/>
+          </a:fontRef>
+        </p:style>
+      </p:cxnSp>
+      <p:sp>
+        <p:nvSpPr>
+          <p:cNvPr id="125" name="Rectangle 124">
+            <a:extLst>
+              <a:ext uri="{FF2B5EF4-FFF2-40B4-BE49-F238E27FC236}">
+                <a16:creationId xmlns:a16="http://schemas.microsoft.com/office/drawing/2014/main" id="{B94B8CB0-B6E8-1E68-3BC7-F99A57807F1D}"/>
+              </a:ext>
+            </a:extLst>
+          </p:cNvPr>
+          <p:cNvSpPr/>
+          <p:nvPr/>
+        </p:nvSpPr>
+        <p:spPr>
+          <a:xfrm>
+            <a:off x="723314" y="3409597"/>
+            <a:ext cx="1880208" cy="528007"/>
+          </a:xfrm>
+          <a:prstGeom prst="rect">
+            <a:avLst/>
+          </a:prstGeom>
+        </p:spPr>
+        <p:style>
+          <a:lnRef idx="2">
+            <a:schemeClr val="accent2">
+              <a:shade val="15000"/>
+            </a:schemeClr>
+          </a:lnRef>
+          <a:fillRef idx="1">
+            <a:schemeClr val="accent2"/>
+          </a:fillRef>
+          <a:effectRef idx="0">
+            <a:schemeClr val="accent2"/>
+          </a:effectRef>
+          <a:fontRef idx="minor">
+            <a:schemeClr val="lt1"/>
+          </a:fontRef>
+        </p:style>
+        <p:txBody>
+          <a:bodyPr rtlCol="0" anchor="ctr"/>
+          <a:lstStyle/>
+          <a:p>
+            <a:pPr algn="ctr"/>
+            <a:r>
+              <a:rPr lang="en-US" dirty="0" err="1"/>
+              <a:t>push_button</a:t>
+            </a:r>
+            <a:endParaRPr lang="en-US" dirty="0"/>
+          </a:p>
+        </p:txBody>
+      </p:sp>
+      <p:cxnSp>
+        <p:nvCxnSpPr>
+          <p:cNvPr id="121" name="Straight Arrow Connector 120">
+            <a:extLst>
+              <a:ext uri="{FF2B5EF4-FFF2-40B4-BE49-F238E27FC236}">
+                <a16:creationId xmlns:a16="http://schemas.microsoft.com/office/drawing/2014/main" id="{50EB79D3-8697-D44C-BEEF-5C85BC9E6679}"/>
+              </a:ext>
+            </a:extLst>
+          </p:cNvPr>
+          <p:cNvCxnSpPr>
+            <a:cxnSpLocks/>
+          </p:cNvCxnSpPr>
+          <p:nvPr/>
+        </p:nvCxnSpPr>
+        <p:spPr>
+          <a:xfrm flipV="1">
+            <a:off x="4959675" y="3664839"/>
+            <a:ext cx="245688" cy="9008"/>
+          </a:xfrm>
+          <a:prstGeom prst="straightConnector1">
+            <a:avLst/>
+          </a:prstGeom>
+          <a:ln w="57150">
+            <a:tailEnd type="triangle"/>
+          </a:ln>
+        </p:spPr>
+        <p:style>
+          <a:lnRef idx="2">
+            <a:schemeClr val="dk1"/>
+          </a:lnRef>
+          <a:fillRef idx="0">
+            <a:schemeClr val="dk1"/>
+          </a:fillRef>
+          <a:effectRef idx="1">
+            <a:schemeClr val="dk1"/>
+          </a:effectRef>
+          <a:fontRef idx="minor">
+            <a:schemeClr val="tx1"/>
+          </a:fontRef>
+        </p:style>
+      </p:cxnSp>
+      <p:cxnSp>
+        <p:nvCxnSpPr>
+          <p:cNvPr id="124" name="Straight Arrow Connector 123">
+            <a:extLst>
+              <a:ext uri="{FF2B5EF4-FFF2-40B4-BE49-F238E27FC236}">
+                <a16:creationId xmlns:a16="http://schemas.microsoft.com/office/drawing/2014/main" id="{C59B8261-42A8-9998-8550-5FCAA9C49A1F}"/>
+              </a:ext>
+            </a:extLst>
+          </p:cNvPr>
+          <p:cNvCxnSpPr>
+            <a:cxnSpLocks/>
+          </p:cNvCxnSpPr>
+          <p:nvPr/>
+        </p:nvCxnSpPr>
+        <p:spPr>
+          <a:xfrm flipV="1">
+            <a:off x="6504250" y="3667254"/>
+            <a:ext cx="245688" cy="9008"/>
+          </a:xfrm>
+          <a:prstGeom prst="straightConnector1">
+            <a:avLst/>
+          </a:prstGeom>
+          <a:ln w="57150">
+            <a:tailEnd type="triangle"/>
+          </a:ln>
+        </p:spPr>
+        <p:style>
+          <a:lnRef idx="2">
+            <a:schemeClr val="dk1"/>
+          </a:lnRef>
+          <a:fillRef idx="0">
+            <a:schemeClr val="dk1"/>
+          </a:fillRef>
+          <a:effectRef idx="1">
+            <a:schemeClr val="dk1"/>
+          </a:effectRef>
+          <a:fontRef idx="minor">
+            <a:schemeClr val="tx1"/>
+          </a:fontRef>
+        </p:style>
+      </p:cxnSp>
+      <p:cxnSp>
+        <p:nvCxnSpPr>
+          <p:cNvPr id="13" name="Straight Arrow Connector 12">
+            <a:extLst>
+              <a:ext uri="{FF2B5EF4-FFF2-40B4-BE49-F238E27FC236}">
+                <a16:creationId xmlns:a16="http://schemas.microsoft.com/office/drawing/2014/main" id="{8B68D3E5-8E41-5F4A-AFC1-7CAFDCC1E2D9}"/>
+              </a:ext>
+            </a:extLst>
+          </p:cNvPr>
+          <p:cNvCxnSpPr>
+            <a:cxnSpLocks/>
+          </p:cNvCxnSpPr>
+          <p:nvPr/>
+        </p:nvCxnSpPr>
+        <p:spPr>
+          <a:xfrm>
+            <a:off x="5725684" y="4263414"/>
+            <a:ext cx="0" cy="420672"/>
+          </a:xfrm>
+          <a:prstGeom prst="straightConnector1">
+            <a:avLst/>
+          </a:prstGeom>
+          <a:ln w="57150">
+            <a:tailEnd type="triangle"/>
+          </a:ln>
+        </p:spPr>
+        <p:style>
+          <a:lnRef idx="2">
+            <a:schemeClr val="dk1"/>
+          </a:lnRef>
+          <a:fillRef idx="0">
+            <a:schemeClr val="dk1"/>
+          </a:fillRef>
+          <a:effectRef idx="1">
+            <a:schemeClr val="dk1"/>
+          </a:effectRef>
+          <a:fontRef idx="minor">
+            <a:schemeClr val="tx1"/>
+          </a:fontRef>
+        </p:style>
+      </p:cxnSp>
+      <p:cxnSp>
+        <p:nvCxnSpPr>
+          <p:cNvPr id="14" name="Straight Connector 13">
+            <a:extLst>
+              <a:ext uri="{FF2B5EF4-FFF2-40B4-BE49-F238E27FC236}">
+                <a16:creationId xmlns:a16="http://schemas.microsoft.com/office/drawing/2014/main" id="{783C5DAD-B7E7-FEA4-6972-18501A00BAB8}"/>
+              </a:ext>
+            </a:extLst>
+          </p:cNvPr>
+          <p:cNvCxnSpPr>
+            <a:cxnSpLocks/>
+          </p:cNvCxnSpPr>
+          <p:nvPr/>
+        </p:nvCxnSpPr>
+        <p:spPr>
+          <a:xfrm flipH="1">
+            <a:off x="5725684" y="4292242"/>
+            <a:ext cx="1682162" cy="0"/>
+          </a:xfrm>
+          <a:prstGeom prst="line">
+            <a:avLst/>
+          </a:prstGeom>
+          <a:ln w="57150"/>
+        </p:spPr>
+        <p:style>
+          <a:lnRef idx="2">
+            <a:schemeClr val="dk1"/>
+          </a:lnRef>
+          <a:fillRef idx="0">
+            <a:schemeClr val="dk1"/>
+          </a:fillRef>
+          <a:effectRef idx="1">
+            <a:schemeClr val="dk1"/>
+          </a:effectRef>
+          <a:fontRef idx="minor">
+            <a:schemeClr val="tx1"/>
+          </a:fontRef>
+        </p:style>
+      </p:cxnSp>
+      <p:cxnSp>
+        <p:nvCxnSpPr>
+          <p:cNvPr id="69" name="Straight Connector 68">
+            <a:extLst>
+              <a:ext uri="{FF2B5EF4-FFF2-40B4-BE49-F238E27FC236}">
+                <a16:creationId xmlns:a16="http://schemas.microsoft.com/office/drawing/2014/main" id="{282E00BA-F167-3D57-7D8D-61562E20FC14}"/>
+              </a:ext>
+            </a:extLst>
+          </p:cNvPr>
+          <p:cNvCxnSpPr>
+            <a:cxnSpLocks/>
+          </p:cNvCxnSpPr>
+          <p:nvPr/>
+        </p:nvCxnSpPr>
+        <p:spPr>
+          <a:xfrm>
+            <a:off x="7391432" y="3929327"/>
+            <a:ext cx="0" cy="389363"/>
+          </a:xfrm>
+          <a:prstGeom prst="line">
+            <a:avLst/>
+          </a:prstGeom>
+          <a:ln w="57150"/>
+        </p:spPr>
+        <p:style>
+          <a:lnRef idx="2">
+            <a:schemeClr val="dk1"/>
+          </a:lnRef>
+          <a:fillRef idx="0">
+            <a:schemeClr val="dk1"/>
+          </a:fillRef>
+          <a:effectRef idx="1">
+            <a:schemeClr val="dk1"/>
+          </a:effectRef>
+          <a:fontRef idx="minor">
+            <a:schemeClr val="tx1"/>
+          </a:fontRef>
+        </p:style>
+      </p:cxnSp>
+      <p:sp>
+        <p:nvSpPr>
+          <p:cNvPr id="78" name="Rectangle 77">
+            <a:extLst>
+              <a:ext uri="{FF2B5EF4-FFF2-40B4-BE49-F238E27FC236}">
+                <a16:creationId xmlns:a16="http://schemas.microsoft.com/office/drawing/2014/main" id="{CB015822-86B8-630C-899F-58141F1C62B1}"/>
+              </a:ext>
+            </a:extLst>
+          </p:cNvPr>
+          <p:cNvSpPr/>
+          <p:nvPr/>
+        </p:nvSpPr>
+        <p:spPr>
+          <a:xfrm>
+            <a:off x="6674578" y="4684086"/>
+            <a:ext cx="1806839" cy="1047633"/>
+          </a:xfrm>
+          <a:prstGeom prst="rect">
+            <a:avLst/>
+          </a:prstGeom>
+        </p:spPr>
+        <p:style>
+          <a:lnRef idx="2">
+            <a:schemeClr val="accent4">
+              <a:shade val="15000"/>
+            </a:schemeClr>
+          </a:lnRef>
+          <a:fillRef idx="1">
+            <a:schemeClr val="accent4"/>
+          </a:fillRef>
+          <a:effectRef idx="0">
+            <a:schemeClr val="accent4"/>
+          </a:effectRef>
+          <a:fontRef idx="minor">
+            <a:schemeClr val="lt1"/>
+          </a:fontRef>
+        </p:style>
+        <p:txBody>
+          <a:bodyPr rtlCol="0" anchor="ctr"/>
+          <a:lstStyle/>
+          <a:p>
+            <a:pPr algn="ctr"/>
+            <a:r>
+              <a:rPr lang="en-US" dirty="0" err="1"/>
+              <a:t>Clk_div</a:t>
+            </a:r>
+            <a:endParaRPr lang="en-US" dirty="0"/>
+          </a:p>
+        </p:txBody>
+      </p:sp>
+      <p:cxnSp>
+        <p:nvCxnSpPr>
+          <p:cNvPr id="83" name="Straight Arrow Connector 82">
+            <a:extLst>
+              <a:ext uri="{FF2B5EF4-FFF2-40B4-BE49-F238E27FC236}">
+                <a16:creationId xmlns:a16="http://schemas.microsoft.com/office/drawing/2014/main" id="{7132913F-059E-66D2-6A93-34C69B0B6C5B}"/>
+              </a:ext>
+            </a:extLst>
+          </p:cNvPr>
+          <p:cNvCxnSpPr>
+            <a:cxnSpLocks/>
+            <a:stCxn id="78" idx="1"/>
+          </p:cNvCxnSpPr>
+          <p:nvPr/>
+        </p:nvCxnSpPr>
+        <p:spPr>
+          <a:xfrm flipH="1">
+            <a:off x="6289602" y="5207903"/>
+            <a:ext cx="384976" cy="0"/>
+          </a:xfrm>
+          <a:prstGeom prst="straightConnector1">
+            <a:avLst/>
+          </a:prstGeom>
+          <a:ln w="57150">
+            <a:tailEnd type="triangle"/>
+          </a:ln>
+        </p:spPr>
+        <p:style>
+          <a:lnRef idx="2">
+            <a:schemeClr val="dk1"/>
+          </a:lnRef>
+          <a:fillRef idx="0">
+            <a:schemeClr val="dk1"/>
+          </a:fillRef>
+          <a:effectRef idx="1">
+            <a:schemeClr val="dk1"/>
+          </a:effectRef>
+          <a:fontRef idx="minor">
+            <a:schemeClr val="tx1"/>
+          </a:fontRef>
+        </p:style>
+      </p:cxnSp>
+      <p:cxnSp>
+        <p:nvCxnSpPr>
+          <p:cNvPr id="122" name="Straight Arrow Connector 121">
+            <a:extLst>
+              <a:ext uri="{FF2B5EF4-FFF2-40B4-BE49-F238E27FC236}">
+                <a16:creationId xmlns:a16="http://schemas.microsoft.com/office/drawing/2014/main" id="{8AC2312A-2507-00C0-2745-3CEE3397E1F4}"/>
+              </a:ext>
+            </a:extLst>
+          </p:cNvPr>
+          <p:cNvCxnSpPr>
+            <a:cxnSpLocks/>
+          </p:cNvCxnSpPr>
+          <p:nvPr/>
+        </p:nvCxnSpPr>
+        <p:spPr>
+          <a:xfrm flipH="1">
+            <a:off x="8439647" y="4876251"/>
+            <a:ext cx="1212822" cy="0"/>
+          </a:xfrm>
+          <a:prstGeom prst="straightConnector1">
+            <a:avLst/>
+          </a:prstGeom>
+          <a:ln w="57150">
+            <a:tailEnd type="triangle"/>
+          </a:ln>
+        </p:spPr>
+        <p:style>
+          <a:lnRef idx="2">
+            <a:schemeClr val="dk1"/>
+          </a:lnRef>
+          <a:fillRef idx="0">
+            <a:schemeClr val="dk1"/>
+          </a:fillRef>
+          <a:effectRef idx="1">
+            <a:schemeClr val="dk1"/>
+          </a:effectRef>
+          <a:fontRef idx="minor">
+            <a:schemeClr val="tx1"/>
+          </a:fontRef>
+        </p:style>
+      </p:cxnSp>
+      <p:sp>
+        <p:nvSpPr>
+          <p:cNvPr id="123" name="Rectangle 122">
+            <a:extLst>
+              <a:ext uri="{FF2B5EF4-FFF2-40B4-BE49-F238E27FC236}">
+                <a16:creationId xmlns:a16="http://schemas.microsoft.com/office/drawing/2014/main" id="{C9F0BE91-F0EA-12EF-205E-674E74E0E2F7}"/>
+              </a:ext>
+            </a:extLst>
+          </p:cNvPr>
+          <p:cNvSpPr/>
+          <p:nvPr/>
+        </p:nvSpPr>
+        <p:spPr>
+          <a:xfrm>
+            <a:off x="9663754" y="5306968"/>
+            <a:ext cx="1880208" cy="528008"/>
+          </a:xfrm>
+          <a:prstGeom prst="rect">
+            <a:avLst/>
+          </a:prstGeom>
+        </p:spPr>
+        <p:style>
+          <a:lnRef idx="2">
+            <a:schemeClr val="accent5">
+              <a:shade val="15000"/>
+            </a:schemeClr>
+          </a:lnRef>
+          <a:fillRef idx="1">
+            <a:schemeClr val="accent5"/>
+          </a:fillRef>
+          <a:effectRef idx="0">
+            <a:schemeClr val="accent5"/>
+          </a:effectRef>
+          <a:fontRef idx="minor">
+            <a:schemeClr val="lt1"/>
+          </a:fontRef>
+        </p:style>
+        <p:txBody>
+          <a:bodyPr rtlCol="0" anchor="ctr"/>
+          <a:lstStyle/>
+          <a:p>
+            <a:pPr algn="ctr"/>
+            <a:r>
+              <a:rPr lang="en-US" dirty="0" err="1"/>
+              <a:t>rst</a:t>
+            </a:r>
+            <a:endParaRPr lang="en-US" dirty="0"/>
+          </a:p>
+        </p:txBody>
+      </p:sp>
+      <p:sp>
+        <p:nvSpPr>
+          <p:cNvPr id="129" name="Rectangle 128">
+            <a:extLst>
+              <a:ext uri="{FF2B5EF4-FFF2-40B4-BE49-F238E27FC236}">
+                <a16:creationId xmlns:a16="http://schemas.microsoft.com/office/drawing/2014/main" id="{31333164-F6C1-0E24-5DE3-D5F555631DA1}"/>
+              </a:ext>
+            </a:extLst>
+          </p:cNvPr>
+          <p:cNvSpPr/>
+          <p:nvPr/>
+        </p:nvSpPr>
+        <p:spPr>
+          <a:xfrm>
+            <a:off x="9660743" y="4612247"/>
+            <a:ext cx="1880208" cy="528008"/>
+          </a:xfrm>
+          <a:prstGeom prst="rect">
+            <a:avLst/>
+          </a:prstGeom>
+        </p:spPr>
+        <p:style>
+          <a:lnRef idx="2">
+            <a:schemeClr val="accent5">
+              <a:shade val="15000"/>
+            </a:schemeClr>
+          </a:lnRef>
+          <a:fillRef idx="1">
+            <a:schemeClr val="accent5"/>
+          </a:fillRef>
+          <a:effectRef idx="0">
+            <a:schemeClr val="accent5"/>
+          </a:effectRef>
+          <a:fontRef idx="minor">
+            <a:schemeClr val="lt1"/>
+          </a:fontRef>
+        </p:style>
+        <p:txBody>
+          <a:bodyPr rtlCol="0" anchor="ctr"/>
+          <a:lstStyle/>
+          <a:p>
+            <a:pPr algn="ctr"/>
+            <a:r>
+              <a:rPr lang="en-US" dirty="0" err="1"/>
+              <a:t>clk</a:t>
+            </a:r>
+            <a:endParaRPr lang="en-US" dirty="0"/>
+          </a:p>
+        </p:txBody>
+      </p:sp>
+      <p:cxnSp>
+        <p:nvCxnSpPr>
+          <p:cNvPr id="134" name="Straight Arrow Connector 133">
+            <a:extLst>
+              <a:ext uri="{FF2B5EF4-FFF2-40B4-BE49-F238E27FC236}">
+                <a16:creationId xmlns:a16="http://schemas.microsoft.com/office/drawing/2014/main" id="{8F4F9223-D724-E6E2-A688-C281D5CC465C}"/>
+              </a:ext>
+            </a:extLst>
+          </p:cNvPr>
+          <p:cNvCxnSpPr>
+            <a:cxnSpLocks/>
+          </p:cNvCxnSpPr>
+          <p:nvPr/>
+        </p:nvCxnSpPr>
+        <p:spPr>
+          <a:xfrm flipH="1">
+            <a:off x="8447921" y="5573533"/>
+            <a:ext cx="1212822" cy="0"/>
+          </a:xfrm>
+          <a:prstGeom prst="straightConnector1">
+            <a:avLst/>
+          </a:prstGeom>
+          <a:ln w="57150">
+            <a:tailEnd type="triangle"/>
+          </a:ln>
+        </p:spPr>
+        <p:style>
+          <a:lnRef idx="2">
+            <a:schemeClr val="dk1"/>
+          </a:lnRef>
+          <a:fillRef idx="0">
+            <a:schemeClr val="dk1"/>
+          </a:fillRef>
+          <a:effectRef idx="1">
+            <a:schemeClr val="dk1"/>
+          </a:effectRef>
+          <a:fontRef idx="minor">
+            <a:schemeClr val="tx1"/>
+          </a:fontRef>
+        </p:style>
+      </p:cxnSp>
     </p:spTree>
     <p:extLst>
       <p:ext uri="{BB962C8B-B14F-4D97-AF65-F5344CB8AC3E}">

</xml_diff>